<commit_message>
department logos.pptx: Add PSE CJL SILS icons
</commit_message>
<xml_diff>
--- a/docs/department logos.pptx
+++ b/docs/department logos.pptx
@@ -304,7 +304,7 @@
           <a:p>
             <a:fld id="{0897BCBE-A2DD-2248-8676-657FEEB74689}" type="datetimeFigureOut">
               <a:rPr lang="en-US" smtClean="0"/>
-              <a:t>1/11/18</a:t>
+              <a:t>6/17/18</a:t>
             </a:fld>
             <a:endParaRPr lang="en-US"/>
           </a:p>
@@ -474,7 +474,7 @@
           <a:p>
             <a:fld id="{0897BCBE-A2DD-2248-8676-657FEEB74689}" type="datetimeFigureOut">
               <a:rPr lang="en-US" smtClean="0"/>
-              <a:t>1/11/18</a:t>
+              <a:t>6/17/18</a:t>
             </a:fld>
             <a:endParaRPr lang="en-US"/>
           </a:p>
@@ -654,7 +654,7 @@
           <a:p>
             <a:fld id="{0897BCBE-A2DD-2248-8676-657FEEB74689}" type="datetimeFigureOut">
               <a:rPr lang="en-US" smtClean="0"/>
-              <a:t>1/11/18</a:t>
+              <a:t>6/17/18</a:t>
             </a:fld>
             <a:endParaRPr lang="en-US"/>
           </a:p>
@@ -824,7 +824,7 @@
           <a:p>
             <a:fld id="{0897BCBE-A2DD-2248-8676-657FEEB74689}" type="datetimeFigureOut">
               <a:rPr lang="en-US" smtClean="0"/>
-              <a:t>1/11/18</a:t>
+              <a:t>6/17/18</a:t>
             </a:fld>
             <a:endParaRPr lang="en-US"/>
           </a:p>
@@ -1070,7 +1070,7 @@
           <a:p>
             <a:fld id="{0897BCBE-A2DD-2248-8676-657FEEB74689}" type="datetimeFigureOut">
               <a:rPr lang="en-US" smtClean="0"/>
-              <a:t>1/11/18</a:t>
+              <a:t>6/17/18</a:t>
             </a:fld>
             <a:endParaRPr lang="en-US"/>
           </a:p>
@@ -1358,7 +1358,7 @@
           <a:p>
             <a:fld id="{0897BCBE-A2DD-2248-8676-657FEEB74689}" type="datetimeFigureOut">
               <a:rPr lang="en-US" smtClean="0"/>
-              <a:t>1/11/18</a:t>
+              <a:t>6/17/18</a:t>
             </a:fld>
             <a:endParaRPr lang="en-US"/>
           </a:p>
@@ -1780,7 +1780,7 @@
           <a:p>
             <a:fld id="{0897BCBE-A2DD-2248-8676-657FEEB74689}" type="datetimeFigureOut">
               <a:rPr lang="en-US" smtClean="0"/>
-              <a:t>1/11/18</a:t>
+              <a:t>6/17/18</a:t>
             </a:fld>
             <a:endParaRPr lang="en-US"/>
           </a:p>
@@ -1898,7 +1898,7 @@
           <a:p>
             <a:fld id="{0897BCBE-A2DD-2248-8676-657FEEB74689}" type="datetimeFigureOut">
               <a:rPr lang="en-US" smtClean="0"/>
-              <a:t>1/11/18</a:t>
+              <a:t>6/17/18</a:t>
             </a:fld>
             <a:endParaRPr lang="en-US"/>
           </a:p>
@@ -1993,7 +1993,7 @@
           <a:p>
             <a:fld id="{0897BCBE-A2DD-2248-8676-657FEEB74689}" type="datetimeFigureOut">
               <a:rPr lang="en-US" smtClean="0"/>
-              <a:t>1/11/18</a:t>
+              <a:t>6/17/18</a:t>
             </a:fld>
             <a:endParaRPr lang="en-US"/>
           </a:p>
@@ -2270,7 +2270,7 @@
           <a:p>
             <a:fld id="{0897BCBE-A2DD-2248-8676-657FEEB74689}" type="datetimeFigureOut">
               <a:rPr lang="en-US" smtClean="0"/>
-              <a:t>1/11/18</a:t>
+              <a:t>6/17/18</a:t>
             </a:fld>
             <a:endParaRPr lang="en-US"/>
           </a:p>
@@ -2523,7 +2523,7 @@
           <a:p>
             <a:fld id="{0897BCBE-A2DD-2248-8676-657FEEB74689}" type="datetimeFigureOut">
               <a:rPr lang="en-US" smtClean="0"/>
-              <a:t>1/11/18</a:t>
+              <a:t>6/17/18</a:t>
             </a:fld>
             <a:endParaRPr lang="en-US"/>
           </a:p>
@@ -2736,7 +2736,7 @@
           <a:p>
             <a:fld id="{0897BCBE-A2DD-2248-8676-657FEEB74689}" type="datetimeFigureOut">
               <a:rPr lang="en-US" smtClean="0"/>
-              <a:t>1/11/18</a:t>
+              <a:t>6/17/18</a:t>
             </a:fld>
             <a:endParaRPr lang="en-US"/>
           </a:p>
@@ -3751,6 +3751,295 @@
                 <a:cs typeface="Vera Humana 95" charset="0"/>
               </a:rPr>
               <a:t>SE</a:t>
+            </a:r>
+            <a:endParaRPr lang="en-US" sz="5000" dirty="0">
+              <a:solidFill>
+                <a:schemeClr val="bg1"/>
+              </a:solidFill>
+              <a:latin typeface="Vera Humana 95" charset="0"/>
+              <a:ea typeface="Vera Humana 95" charset="0"/>
+              <a:cs typeface="Vera Humana 95" charset="0"/>
+            </a:endParaRPr>
+          </a:p>
+        </p:txBody>
+      </p:sp>
+      <p:sp>
+        <p:nvSpPr>
+          <p:cNvPr id="18" name="Rectangle 17"/>
+          <p:cNvSpPr/>
+          <p:nvPr/>
+        </p:nvSpPr>
+        <p:spPr>
+          <a:xfrm rot="2700000">
+            <a:off x="2929341" y="5329880"/>
+            <a:ext cx="1080000" cy="1080000"/>
+          </a:xfrm>
+          <a:prstGeom prst="rect">
+            <a:avLst/>
+          </a:prstGeom>
+          <a:solidFill>
+            <a:srgbClr val="C3462B"/>
+          </a:solidFill>
+          <a:ln>
+            <a:noFill/>
+          </a:ln>
+          <a:effectLst/>
+        </p:spPr>
+        <p:style>
+          <a:lnRef idx="1">
+            <a:schemeClr val="accent1"/>
+          </a:lnRef>
+          <a:fillRef idx="3">
+            <a:schemeClr val="accent1"/>
+          </a:fillRef>
+          <a:effectRef idx="2">
+            <a:schemeClr val="accent1"/>
+          </a:effectRef>
+          <a:fontRef idx="minor">
+            <a:schemeClr val="lt1"/>
+          </a:fontRef>
+        </p:style>
+        <p:txBody>
+          <a:bodyPr rtlCol="0" anchor="ctr"/>
+          <a:lstStyle/>
+          <a:p>
+            <a:pPr algn="ctr"/>
+            <a:endParaRPr lang="en-US"/>
+          </a:p>
+        </p:txBody>
+      </p:sp>
+      <p:sp>
+        <p:nvSpPr>
+          <p:cNvPr id="23" name="TextBox 22"/>
+          <p:cNvSpPr txBox="1"/>
+          <p:nvPr/>
+        </p:nvSpPr>
+        <p:spPr>
+          <a:xfrm flipH="1">
+            <a:off x="2891422" y="5469325"/>
+            <a:ext cx="1170779" cy="861774"/>
+          </a:xfrm>
+          <a:prstGeom prst="rect">
+            <a:avLst/>
+          </a:prstGeom>
+          <a:noFill/>
+        </p:spPr>
+        <p:txBody>
+          <a:bodyPr wrap="square" rtlCol="0">
+            <a:spAutoFit/>
+          </a:bodyPr>
+          <a:lstStyle/>
+          <a:p>
+            <a:r>
+              <a:rPr lang="en-US" sz="5000" dirty="0">
+                <a:solidFill>
+                  <a:schemeClr val="bg1"/>
+                </a:solidFill>
+                <a:latin typeface="Vera Humana 95" charset="0"/>
+                <a:ea typeface="Vera Humana 95" charset="0"/>
+                <a:cs typeface="Vera Humana 95" charset="0"/>
+              </a:rPr>
+              <a:t>P</a:t>
+            </a:r>
+            <a:r>
+              <a:rPr lang="en-US" sz="5000" dirty="0" smtClean="0">
+                <a:solidFill>
+                  <a:schemeClr val="bg1"/>
+                </a:solidFill>
+                <a:latin typeface="Vera Humana 95" charset="0"/>
+                <a:ea typeface="Vera Humana 95" charset="0"/>
+                <a:cs typeface="Vera Humana 95" charset="0"/>
+              </a:rPr>
+              <a:t>SE</a:t>
+            </a:r>
+            <a:endParaRPr lang="en-US" sz="5000" dirty="0">
+              <a:solidFill>
+                <a:schemeClr val="bg1"/>
+              </a:solidFill>
+              <a:latin typeface="Vera Humana 95" charset="0"/>
+              <a:ea typeface="Vera Humana 95" charset="0"/>
+              <a:cs typeface="Vera Humana 95" charset="0"/>
+            </a:endParaRPr>
+          </a:p>
+        </p:txBody>
+      </p:sp>
+      <p:sp>
+        <p:nvSpPr>
+          <p:cNvPr id="25" name="Rectangle 24"/>
+          <p:cNvSpPr/>
+          <p:nvPr/>
+        </p:nvSpPr>
+        <p:spPr>
+          <a:xfrm rot="2700000">
+            <a:off x="4680826" y="5305733"/>
+            <a:ext cx="1080000" cy="1080000"/>
+          </a:xfrm>
+          <a:prstGeom prst="rect">
+            <a:avLst/>
+          </a:prstGeom>
+          <a:solidFill>
+            <a:srgbClr val="8C192B"/>
+          </a:solidFill>
+          <a:ln>
+            <a:noFill/>
+          </a:ln>
+          <a:effectLst/>
+        </p:spPr>
+        <p:style>
+          <a:lnRef idx="1">
+            <a:schemeClr val="accent1"/>
+          </a:lnRef>
+          <a:fillRef idx="3">
+            <a:schemeClr val="accent1"/>
+          </a:fillRef>
+          <a:effectRef idx="2">
+            <a:schemeClr val="accent1"/>
+          </a:effectRef>
+          <a:fontRef idx="minor">
+            <a:schemeClr val="lt1"/>
+          </a:fontRef>
+        </p:style>
+        <p:txBody>
+          <a:bodyPr rtlCol="0" anchor="ctr"/>
+          <a:lstStyle/>
+          <a:p>
+            <a:pPr algn="ctr"/>
+            <a:endParaRPr lang="en-US"/>
+          </a:p>
+        </p:txBody>
+      </p:sp>
+      <p:sp>
+        <p:nvSpPr>
+          <p:cNvPr id="26" name="TextBox 25"/>
+          <p:cNvSpPr txBox="1"/>
+          <p:nvPr/>
+        </p:nvSpPr>
+        <p:spPr>
+          <a:xfrm flipH="1">
+            <a:off x="4691459" y="5428994"/>
+            <a:ext cx="1170779" cy="861774"/>
+          </a:xfrm>
+          <a:prstGeom prst="rect">
+            <a:avLst/>
+          </a:prstGeom>
+          <a:noFill/>
+        </p:spPr>
+        <p:txBody>
+          <a:bodyPr wrap="square" rtlCol="0">
+            <a:spAutoFit/>
+          </a:bodyPr>
+          <a:lstStyle/>
+          <a:p>
+            <a:r>
+              <a:rPr lang="en-US" sz="5000" smtClean="0">
+                <a:solidFill>
+                  <a:schemeClr val="bg1"/>
+                </a:solidFill>
+                <a:latin typeface="Vera Humana 95" charset="0"/>
+                <a:ea typeface="Vera Humana 95" charset="0"/>
+                <a:cs typeface="Vera Humana 95" charset="0"/>
+              </a:rPr>
+              <a:t>CJL</a:t>
+            </a:r>
+            <a:endParaRPr lang="en-US" sz="5000" dirty="0">
+              <a:solidFill>
+                <a:schemeClr val="bg1"/>
+              </a:solidFill>
+              <a:latin typeface="Vera Humana 95" charset="0"/>
+              <a:ea typeface="Vera Humana 95" charset="0"/>
+              <a:cs typeface="Vera Humana 95" charset="0"/>
+            </a:endParaRPr>
+          </a:p>
+        </p:txBody>
+      </p:sp>
+      <p:sp>
+        <p:nvSpPr>
+          <p:cNvPr id="27" name="Rectangle 26"/>
+          <p:cNvSpPr/>
+          <p:nvPr/>
+        </p:nvSpPr>
+        <p:spPr>
+          <a:xfrm rot="2700000">
+            <a:off x="6283652" y="5441949"/>
+            <a:ext cx="1080000" cy="1080000"/>
+          </a:xfrm>
+          <a:prstGeom prst="rect">
+            <a:avLst/>
+          </a:prstGeom>
+          <a:solidFill>
+            <a:srgbClr val="1BB2A8"/>
+          </a:solidFill>
+          <a:ln>
+            <a:noFill/>
+          </a:ln>
+          <a:effectLst/>
+        </p:spPr>
+        <p:style>
+          <a:lnRef idx="1">
+            <a:schemeClr val="accent1"/>
+          </a:lnRef>
+          <a:fillRef idx="3">
+            <a:schemeClr val="accent1"/>
+          </a:fillRef>
+          <a:effectRef idx="2">
+            <a:schemeClr val="accent1"/>
+          </a:effectRef>
+          <a:fontRef idx="minor">
+            <a:schemeClr val="lt1"/>
+          </a:fontRef>
+        </p:style>
+        <p:txBody>
+          <a:bodyPr rtlCol="0" anchor="ctr"/>
+          <a:lstStyle/>
+          <a:p>
+            <a:pPr algn="ctr"/>
+            <a:endParaRPr lang="en-US"/>
+          </a:p>
+        </p:txBody>
+      </p:sp>
+      <p:sp>
+        <p:nvSpPr>
+          <p:cNvPr id="28" name="TextBox 27"/>
+          <p:cNvSpPr txBox="1"/>
+          <p:nvPr/>
+        </p:nvSpPr>
+        <p:spPr>
+          <a:xfrm flipH="1">
+            <a:off x="6197180" y="5573302"/>
+            <a:ext cx="1305622" cy="861774"/>
+          </a:xfrm>
+          <a:prstGeom prst="rect">
+            <a:avLst/>
+          </a:prstGeom>
+          <a:noFill/>
+        </p:spPr>
+        <p:txBody>
+          <a:bodyPr wrap="square" rtlCol="0">
+            <a:spAutoFit/>
+          </a:bodyPr>
+          <a:lstStyle/>
+          <a:p>
+            <a:r>
+              <a:rPr lang="en-US" sz="5000" smtClean="0">
+                <a:solidFill>
+                  <a:schemeClr val="bg1"/>
+                </a:solidFill>
+                <a:latin typeface="Vera Humana 95" charset="0"/>
+                <a:ea typeface="Vera Humana 95" charset="0"/>
+                <a:cs typeface="Vera Humana 95" charset="0"/>
+              </a:rPr>
+              <a:t>SI</a:t>
+            </a:r>
+            <a:r>
+              <a:rPr lang="en-US" sz="5000" smtClean="0">
+                <a:solidFill>
+                  <a:schemeClr val="bg1"/>
+                </a:solidFill>
+                <a:latin typeface="Vera Humana 95" charset="0"/>
+                <a:ea typeface="Vera Humana 95" charset="0"/>
+                <a:cs typeface="Vera Humana 95" charset="0"/>
+              </a:rPr>
+              <a:t>LS</a:t>
             </a:r>
             <a:endParaRPr lang="en-US" sz="5000" dirty="0">
               <a:solidFill>

</xml_diff>

<commit_message>
Add sss department logo
</commit_message>
<xml_diff>
--- a/docs/department logos.pptx
+++ b/docs/department logos.pptx
@@ -6,6 +6,7 @@
   </p:sldMasterIdLst>
   <p:sldIdLst>
     <p:sldId id="256" r:id="rId2"/>
+    <p:sldId id="257" r:id="rId3"/>
   </p:sldIdLst>
   <p:sldSz cx="9144000" cy="6858000" type="screen4x3"/>
   <p:notesSz cx="6858000" cy="9144000"/>
@@ -304,7 +305,7 @@
           <a:p>
             <a:fld id="{0897BCBE-A2DD-2248-8676-657FEEB74689}" type="datetimeFigureOut">
               <a:rPr lang="en-US" smtClean="0"/>
-              <a:t>6/17/18</a:t>
+              <a:t>10/5/18</a:t>
             </a:fld>
             <a:endParaRPr lang="en-US"/>
           </a:p>
@@ -474,7 +475,7 @@
           <a:p>
             <a:fld id="{0897BCBE-A2DD-2248-8676-657FEEB74689}" type="datetimeFigureOut">
               <a:rPr lang="en-US" smtClean="0"/>
-              <a:t>6/17/18</a:t>
+              <a:t>10/5/18</a:t>
             </a:fld>
             <a:endParaRPr lang="en-US"/>
           </a:p>
@@ -654,7 +655,7 @@
           <a:p>
             <a:fld id="{0897BCBE-A2DD-2248-8676-657FEEB74689}" type="datetimeFigureOut">
               <a:rPr lang="en-US" smtClean="0"/>
-              <a:t>6/17/18</a:t>
+              <a:t>10/5/18</a:t>
             </a:fld>
             <a:endParaRPr lang="en-US"/>
           </a:p>
@@ -824,7 +825,7 @@
           <a:p>
             <a:fld id="{0897BCBE-A2DD-2248-8676-657FEEB74689}" type="datetimeFigureOut">
               <a:rPr lang="en-US" smtClean="0"/>
-              <a:t>6/17/18</a:t>
+              <a:t>10/5/18</a:t>
             </a:fld>
             <a:endParaRPr lang="en-US"/>
           </a:p>
@@ -1070,7 +1071,7 @@
           <a:p>
             <a:fld id="{0897BCBE-A2DD-2248-8676-657FEEB74689}" type="datetimeFigureOut">
               <a:rPr lang="en-US" smtClean="0"/>
-              <a:t>6/17/18</a:t>
+              <a:t>10/5/18</a:t>
             </a:fld>
             <a:endParaRPr lang="en-US"/>
           </a:p>
@@ -1358,7 +1359,7 @@
           <a:p>
             <a:fld id="{0897BCBE-A2DD-2248-8676-657FEEB74689}" type="datetimeFigureOut">
               <a:rPr lang="en-US" smtClean="0"/>
-              <a:t>6/17/18</a:t>
+              <a:t>10/5/18</a:t>
             </a:fld>
             <a:endParaRPr lang="en-US"/>
           </a:p>
@@ -1780,7 +1781,7 @@
           <a:p>
             <a:fld id="{0897BCBE-A2DD-2248-8676-657FEEB74689}" type="datetimeFigureOut">
               <a:rPr lang="en-US" smtClean="0"/>
-              <a:t>6/17/18</a:t>
+              <a:t>10/5/18</a:t>
             </a:fld>
             <a:endParaRPr lang="en-US"/>
           </a:p>
@@ -1898,7 +1899,7 @@
           <a:p>
             <a:fld id="{0897BCBE-A2DD-2248-8676-657FEEB74689}" type="datetimeFigureOut">
               <a:rPr lang="en-US" smtClean="0"/>
-              <a:t>6/17/18</a:t>
+              <a:t>10/5/18</a:t>
             </a:fld>
             <a:endParaRPr lang="en-US"/>
           </a:p>
@@ -1993,7 +1994,7 @@
           <a:p>
             <a:fld id="{0897BCBE-A2DD-2248-8676-657FEEB74689}" type="datetimeFigureOut">
               <a:rPr lang="en-US" smtClean="0"/>
-              <a:t>6/17/18</a:t>
+              <a:t>10/5/18</a:t>
             </a:fld>
             <a:endParaRPr lang="en-US"/>
           </a:p>
@@ -2270,7 +2271,7 @@
           <a:p>
             <a:fld id="{0897BCBE-A2DD-2248-8676-657FEEB74689}" type="datetimeFigureOut">
               <a:rPr lang="en-US" smtClean="0"/>
-              <a:t>6/17/18</a:t>
+              <a:t>10/5/18</a:t>
             </a:fld>
             <a:endParaRPr lang="en-US"/>
           </a:p>
@@ -2523,7 +2524,7 @@
           <a:p>
             <a:fld id="{0897BCBE-A2DD-2248-8676-657FEEB74689}" type="datetimeFigureOut">
               <a:rPr lang="en-US" smtClean="0"/>
-              <a:t>6/17/18</a:t>
+              <a:t>10/5/18</a:t>
             </a:fld>
             <a:endParaRPr lang="en-US"/>
           </a:p>
@@ -2736,7 +2737,7 @@
           <a:p>
             <a:fld id="{0897BCBE-A2DD-2248-8676-657FEEB74689}" type="datetimeFigureOut">
               <a:rPr lang="en-US" smtClean="0"/>
-              <a:t>6/17/18</a:t>
+              <a:t>10/5/18</a:t>
             </a:fld>
             <a:endParaRPr lang="en-US"/>
           </a:p>
@@ -4099,6 +4100,170 @@
 </p:sld>
 </file>
 
+<file path=ppt/slides/slide2.xml><?xml version="1.0" encoding="utf-8"?>
+<p:sld xmlns:a="http://schemas.openxmlformats.org/drawingml/2006/main" xmlns:r="http://schemas.openxmlformats.org/officeDocument/2006/relationships" xmlns:p="http://schemas.openxmlformats.org/presentationml/2006/main">
+  <p:cSld>
+    <p:spTree>
+      <p:nvGrpSpPr>
+        <p:cNvPr id="1" name=""/>
+        <p:cNvGrpSpPr/>
+        <p:nvPr/>
+      </p:nvGrpSpPr>
+      <p:grpSpPr>
+        <a:xfrm>
+          <a:off x="0" y="0"/>
+          <a:ext cx="0" cy="0"/>
+          <a:chOff x="0" y="0"/>
+          <a:chExt cx="0" cy="0"/>
+        </a:xfrm>
+      </p:grpSpPr>
+      <p:sp>
+        <p:nvSpPr>
+          <p:cNvPr id="4" name="Rectangle 3"/>
+          <p:cNvSpPr/>
+          <p:nvPr/>
+        </p:nvSpPr>
+        <p:spPr>
+          <a:xfrm rot="2700000">
+            <a:off x="3975880" y="4097024"/>
+            <a:ext cx="1080000" cy="1080000"/>
+          </a:xfrm>
+          <a:prstGeom prst="rect">
+            <a:avLst/>
+          </a:prstGeom>
+          <a:solidFill>
+            <a:srgbClr val="EC8A00"/>
+          </a:solidFill>
+          <a:ln>
+            <a:noFill/>
+          </a:ln>
+          <a:effectLst/>
+        </p:spPr>
+        <p:style>
+          <a:lnRef idx="1">
+            <a:schemeClr val="accent1"/>
+          </a:lnRef>
+          <a:fillRef idx="3">
+            <a:schemeClr val="accent1"/>
+          </a:fillRef>
+          <a:effectRef idx="2">
+            <a:schemeClr val="accent1"/>
+          </a:effectRef>
+          <a:fontRef idx="minor">
+            <a:schemeClr val="lt1"/>
+          </a:fontRef>
+        </p:style>
+        <p:txBody>
+          <a:bodyPr rtlCol="0" anchor="ctr"/>
+          <a:lstStyle/>
+          <a:p>
+            <a:pPr algn="ctr"/>
+            <a:endParaRPr lang="en-US">
+              <a:solidFill>
+                <a:srgbClr val="E8FFFF"/>
+              </a:solidFill>
+            </a:endParaRPr>
+          </a:p>
+        </p:txBody>
+      </p:sp>
+      <p:sp>
+        <p:nvSpPr>
+          <p:cNvPr id="5" name="TextBox 4"/>
+          <p:cNvSpPr txBox="1"/>
+          <p:nvPr/>
+        </p:nvSpPr>
+        <p:spPr>
+          <a:xfrm flipH="1">
+            <a:off x="3970249" y="4228377"/>
+            <a:ext cx="1200560" cy="861774"/>
+          </a:xfrm>
+          <a:prstGeom prst="rect">
+            <a:avLst/>
+          </a:prstGeom>
+          <a:noFill/>
+        </p:spPr>
+        <p:txBody>
+          <a:bodyPr wrap="square" rtlCol="0">
+            <a:spAutoFit/>
+          </a:bodyPr>
+          <a:lstStyle/>
+          <a:p>
+            <a:r>
+              <a:rPr lang="en-US" sz="5000" dirty="0" smtClean="0">
+                <a:solidFill>
+                  <a:schemeClr val="bg1"/>
+                </a:solidFill>
+                <a:latin typeface="Vera Humana 95" charset="0"/>
+                <a:ea typeface="Vera Humana 95" charset="0"/>
+                <a:cs typeface="Vera Humana 95" charset="0"/>
+              </a:rPr>
+              <a:t>SSS</a:t>
+            </a:r>
+            <a:endParaRPr lang="en-US" sz="5000" dirty="0">
+              <a:solidFill>
+                <a:schemeClr val="bg1"/>
+              </a:solidFill>
+              <a:latin typeface="Vera Humana 95" charset="0"/>
+              <a:ea typeface="Vera Humana 95" charset="0"/>
+              <a:cs typeface="Vera Humana 95" charset="0"/>
+            </a:endParaRPr>
+          </a:p>
+        </p:txBody>
+      </p:sp>
+      <p:pic>
+        <p:nvPicPr>
+          <p:cNvPr id="6" name="Picture 2" descr="https://www.waseda.jp/top/assets/uploads/2014/04/logo_sss_aca-290x290.png"/>
+          <p:cNvPicPr>
+            <a:picLocks noChangeAspect="1" noChangeArrowheads="1"/>
+          </p:cNvPicPr>
+          <p:nvPr/>
+        </p:nvPicPr>
+        <p:blipFill>
+          <a:blip r:embed="rId2">
+            <a:extLst>
+              <a:ext uri="{28A0092B-C50C-407E-A947-70E740481C1C}">
+                <a14:useLocalDpi xmlns:a14="http://schemas.microsoft.com/office/drawing/2010/main" val="0"/>
+              </a:ext>
+            </a:extLst>
+          </a:blip>
+          <a:srcRect/>
+          <a:stretch>
+            <a:fillRect/>
+          </a:stretch>
+        </p:blipFill>
+        <p:spPr bwMode="auto">
+          <a:xfrm>
+            <a:off x="186756" y="604781"/>
+            <a:ext cx="2762250" cy="2762250"/>
+          </a:xfrm>
+          <a:prstGeom prst="rect">
+            <a:avLst/>
+          </a:prstGeom>
+          <a:noFill/>
+          <a:extLst>
+            <a:ext uri="{909E8E84-426E-40DD-AFC4-6F175D3DCCD1}">
+              <a14:hiddenFill xmlns:a14="http://schemas.microsoft.com/office/drawing/2010/main">
+                <a:solidFill>
+                  <a:srgbClr val="FFFFFF"/>
+                </a:solidFill>
+              </a14:hiddenFill>
+            </a:ext>
+          </a:extLst>
+        </p:spPr>
+      </p:pic>
+    </p:spTree>
+    <p:extLst>
+      <p:ext uri="{BB962C8B-B14F-4D97-AF65-F5344CB8AC3E}">
+        <p14:creationId xmlns:p14="http://schemas.microsoft.com/office/powerpoint/2010/main" val="898859568"/>
+      </p:ext>
+    </p:extLst>
+  </p:cSld>
+  <p:clrMapOvr>
+    <a:masterClrMapping/>
+  </p:clrMapOvr>
+</p:sld>
+</file>
+
 <file path=ppt/theme/theme1.xml><?xml version="1.0" encoding="utf-8"?>
 <a:theme xmlns:a="http://schemas.openxmlformats.org/drawingml/2006/main" name="Office Theme">
   <a:themeElements>

</xml_diff>

<commit_message>
Create icon for GEC
</commit_message>
<xml_diff>
--- a/docs/department logos.pptx
+++ b/docs/department logos.pptx
@@ -305,7 +305,7 @@
           <a:p>
             <a:fld id="{0897BCBE-A2DD-2248-8676-657FEEB74689}" type="datetimeFigureOut">
               <a:rPr lang="en-US" smtClean="0"/>
-              <a:t>10/5/18</a:t>
+              <a:t>3/11/19</a:t>
             </a:fld>
             <a:endParaRPr lang="en-US"/>
           </a:p>
@@ -475,7 +475,7 @@
           <a:p>
             <a:fld id="{0897BCBE-A2DD-2248-8676-657FEEB74689}" type="datetimeFigureOut">
               <a:rPr lang="en-US" smtClean="0"/>
-              <a:t>10/5/18</a:t>
+              <a:t>3/11/19</a:t>
             </a:fld>
             <a:endParaRPr lang="en-US"/>
           </a:p>
@@ -655,7 +655,7 @@
           <a:p>
             <a:fld id="{0897BCBE-A2DD-2248-8676-657FEEB74689}" type="datetimeFigureOut">
               <a:rPr lang="en-US" smtClean="0"/>
-              <a:t>10/5/18</a:t>
+              <a:t>3/11/19</a:t>
             </a:fld>
             <a:endParaRPr lang="en-US"/>
           </a:p>
@@ -825,7 +825,7 @@
           <a:p>
             <a:fld id="{0897BCBE-A2DD-2248-8676-657FEEB74689}" type="datetimeFigureOut">
               <a:rPr lang="en-US" smtClean="0"/>
-              <a:t>10/5/18</a:t>
+              <a:t>3/11/19</a:t>
             </a:fld>
             <a:endParaRPr lang="en-US"/>
           </a:p>
@@ -1071,7 +1071,7 @@
           <a:p>
             <a:fld id="{0897BCBE-A2DD-2248-8676-657FEEB74689}" type="datetimeFigureOut">
               <a:rPr lang="en-US" smtClean="0"/>
-              <a:t>10/5/18</a:t>
+              <a:t>3/11/19</a:t>
             </a:fld>
             <a:endParaRPr lang="en-US"/>
           </a:p>
@@ -1359,7 +1359,7 @@
           <a:p>
             <a:fld id="{0897BCBE-A2DD-2248-8676-657FEEB74689}" type="datetimeFigureOut">
               <a:rPr lang="en-US" smtClean="0"/>
-              <a:t>10/5/18</a:t>
+              <a:t>3/11/19</a:t>
             </a:fld>
             <a:endParaRPr lang="en-US"/>
           </a:p>
@@ -1781,7 +1781,7 @@
           <a:p>
             <a:fld id="{0897BCBE-A2DD-2248-8676-657FEEB74689}" type="datetimeFigureOut">
               <a:rPr lang="en-US" smtClean="0"/>
-              <a:t>10/5/18</a:t>
+              <a:t>3/11/19</a:t>
             </a:fld>
             <a:endParaRPr lang="en-US"/>
           </a:p>
@@ -1899,7 +1899,7 @@
           <a:p>
             <a:fld id="{0897BCBE-A2DD-2248-8676-657FEEB74689}" type="datetimeFigureOut">
               <a:rPr lang="en-US" smtClean="0"/>
-              <a:t>10/5/18</a:t>
+              <a:t>3/11/19</a:t>
             </a:fld>
             <a:endParaRPr lang="en-US"/>
           </a:p>
@@ -1994,7 +1994,7 @@
           <a:p>
             <a:fld id="{0897BCBE-A2DD-2248-8676-657FEEB74689}" type="datetimeFigureOut">
               <a:rPr lang="en-US" smtClean="0"/>
-              <a:t>10/5/18</a:t>
+              <a:t>3/11/19</a:t>
             </a:fld>
             <a:endParaRPr lang="en-US"/>
           </a:p>
@@ -2271,7 +2271,7 @@
           <a:p>
             <a:fld id="{0897BCBE-A2DD-2248-8676-657FEEB74689}" type="datetimeFigureOut">
               <a:rPr lang="en-US" smtClean="0"/>
-              <a:t>10/5/18</a:t>
+              <a:t>3/11/19</a:t>
             </a:fld>
             <a:endParaRPr lang="en-US"/>
           </a:p>
@@ -2524,7 +2524,7 @@
           <a:p>
             <a:fld id="{0897BCBE-A2DD-2248-8676-657FEEB74689}" type="datetimeFigureOut">
               <a:rPr lang="en-US" smtClean="0"/>
-              <a:t>10/5/18</a:t>
+              <a:t>3/11/19</a:t>
             </a:fld>
             <a:endParaRPr lang="en-US"/>
           </a:p>
@@ -2737,7 +2737,7 @@
           <a:p>
             <a:fld id="{0897BCBE-A2DD-2248-8676-657FEEB74689}" type="datetimeFigureOut">
               <a:rPr lang="en-US" smtClean="0"/>
-              <a:t>10/5/18</a:t>
+              <a:t>3/11/19</a:t>
             </a:fld>
             <a:endParaRPr lang="en-US"/>
           </a:p>
@@ -4087,6 +4087,95 @@
           </p:txBody>
         </p:sp>
       </p:grpSp>
+      <p:sp>
+        <p:nvSpPr>
+          <p:cNvPr id="29" name="Rectangle 28"/>
+          <p:cNvSpPr/>
+          <p:nvPr/>
+        </p:nvSpPr>
+        <p:spPr>
+          <a:xfrm rot="2700000">
+            <a:off x="930924" y="5237996"/>
+            <a:ext cx="1080000" cy="1080000"/>
+          </a:xfrm>
+          <a:prstGeom prst="rect">
+            <a:avLst/>
+          </a:prstGeom>
+          <a:solidFill>
+            <a:srgbClr val="3D985C"/>
+          </a:solidFill>
+          <a:ln>
+            <a:noFill/>
+          </a:ln>
+          <a:effectLst/>
+        </p:spPr>
+        <p:style>
+          <a:lnRef idx="1">
+            <a:schemeClr val="accent1"/>
+          </a:lnRef>
+          <a:fillRef idx="3">
+            <a:schemeClr val="accent1"/>
+          </a:fillRef>
+          <a:effectRef idx="2">
+            <a:schemeClr val="accent1"/>
+          </a:effectRef>
+          <a:fontRef idx="minor">
+            <a:schemeClr val="lt1"/>
+          </a:fontRef>
+        </p:style>
+        <p:txBody>
+          <a:bodyPr rtlCol="0" anchor="ctr"/>
+          <a:lstStyle/>
+          <a:p>
+            <a:pPr algn="ctr"/>
+            <a:endParaRPr lang="en-US"/>
+          </a:p>
+        </p:txBody>
+      </p:sp>
+      <p:sp>
+        <p:nvSpPr>
+          <p:cNvPr id="30" name="TextBox 29"/>
+          <p:cNvSpPr txBox="1"/>
+          <p:nvPr/>
+        </p:nvSpPr>
+        <p:spPr>
+          <a:xfrm flipH="1">
+            <a:off x="755360" y="5369349"/>
+            <a:ext cx="1421703" cy="861774"/>
+          </a:xfrm>
+          <a:prstGeom prst="rect">
+            <a:avLst/>
+          </a:prstGeom>
+          <a:noFill/>
+        </p:spPr>
+        <p:txBody>
+          <a:bodyPr wrap="square" rtlCol="0">
+            <a:spAutoFit/>
+          </a:bodyPr>
+          <a:lstStyle/>
+          <a:p>
+            <a:r>
+              <a:rPr lang="en-US" sz="5000" dirty="0" smtClean="0">
+                <a:solidFill>
+                  <a:schemeClr val="bg1"/>
+                </a:solidFill>
+                <a:latin typeface="Vera Humana 95" charset="0"/>
+                <a:ea typeface="Vera Humana 95" charset="0"/>
+                <a:cs typeface="Vera Humana 95" charset="0"/>
+              </a:rPr>
+              <a:t>GEC</a:t>
+            </a:r>
+            <a:endParaRPr lang="en-US" sz="5000" dirty="0">
+              <a:solidFill>
+                <a:schemeClr val="bg1"/>
+              </a:solidFill>
+              <a:latin typeface="Vera Humana 95" charset="0"/>
+              <a:ea typeface="Vera Humana 95" charset="0"/>
+              <a:cs typeface="Vera Humana 95" charset="0"/>
+            </a:endParaRPr>
+          </a:p>
+        </p:txBody>
+      </p:sp>
     </p:spTree>
     <p:extLst>
       <p:ext uri="{BB962C8B-B14F-4D97-AF65-F5344CB8AC3E}">

</xml_diff>

<commit_message>
Update ppt for department logos
</commit_message>
<xml_diff>
--- a/docs/department logos.pptx
+++ b/docs/department logos.pptx
@@ -4087,95 +4087,110 @@
           </p:txBody>
         </p:sp>
       </p:grpSp>
-      <p:sp>
-        <p:nvSpPr>
-          <p:cNvPr id="29" name="Rectangle 28"/>
-          <p:cNvSpPr/>
+      <p:grpSp>
+        <p:nvGrpSpPr>
+          <p:cNvPr id="15" name="Group 14"/>
+          <p:cNvGrpSpPr/>
           <p:nvPr/>
-        </p:nvSpPr>
-        <p:spPr>
-          <a:xfrm rot="2700000">
-            <a:off x="930924" y="5237996"/>
-            <a:ext cx="1080000" cy="1080000"/>
+        </p:nvGrpSpPr>
+        <p:grpSpPr>
+          <a:xfrm>
+            <a:off x="755360" y="5237996"/>
+            <a:ext cx="1421703" cy="1080000"/>
+            <a:chOff x="755360" y="5237996"/>
+            <a:chExt cx="1421703" cy="1080000"/>
           </a:xfrm>
-          <a:prstGeom prst="rect">
-            <a:avLst/>
-          </a:prstGeom>
-          <a:solidFill>
-            <a:srgbClr val="3D985C"/>
-          </a:solidFill>
-          <a:ln>
+        </p:grpSpPr>
+        <p:sp>
+          <p:nvSpPr>
+            <p:cNvPr id="29" name="Rectangle 28"/>
+            <p:cNvSpPr/>
+            <p:nvPr/>
+          </p:nvSpPr>
+          <p:spPr>
+            <a:xfrm rot="2700000">
+              <a:off x="930924" y="5237996"/>
+              <a:ext cx="1080000" cy="1080000"/>
+            </a:xfrm>
+            <a:prstGeom prst="rect">
+              <a:avLst/>
+            </a:prstGeom>
+            <a:solidFill>
+              <a:srgbClr val="3D985C"/>
+            </a:solidFill>
+            <a:ln>
+              <a:noFill/>
+            </a:ln>
+            <a:effectLst/>
+          </p:spPr>
+          <p:style>
+            <a:lnRef idx="1">
+              <a:schemeClr val="accent1"/>
+            </a:lnRef>
+            <a:fillRef idx="3">
+              <a:schemeClr val="accent1"/>
+            </a:fillRef>
+            <a:effectRef idx="2">
+              <a:schemeClr val="accent1"/>
+            </a:effectRef>
+            <a:fontRef idx="minor">
+              <a:schemeClr val="lt1"/>
+            </a:fontRef>
+          </p:style>
+          <p:txBody>
+            <a:bodyPr rtlCol="0" anchor="ctr"/>
+            <a:lstStyle/>
+            <a:p>
+              <a:pPr algn="ctr"/>
+              <a:endParaRPr lang="en-US"/>
+            </a:p>
+          </p:txBody>
+        </p:sp>
+        <p:sp>
+          <p:nvSpPr>
+            <p:cNvPr id="30" name="TextBox 29"/>
+            <p:cNvSpPr txBox="1"/>
+            <p:nvPr/>
+          </p:nvSpPr>
+          <p:spPr>
+            <a:xfrm flipH="1">
+              <a:off x="755360" y="5369349"/>
+              <a:ext cx="1421703" cy="861774"/>
+            </a:xfrm>
+            <a:prstGeom prst="rect">
+              <a:avLst/>
+            </a:prstGeom>
             <a:noFill/>
-          </a:ln>
-          <a:effectLst/>
-        </p:spPr>
-        <p:style>
-          <a:lnRef idx="1">
-            <a:schemeClr val="accent1"/>
-          </a:lnRef>
-          <a:fillRef idx="3">
-            <a:schemeClr val="accent1"/>
-          </a:fillRef>
-          <a:effectRef idx="2">
-            <a:schemeClr val="accent1"/>
-          </a:effectRef>
-          <a:fontRef idx="minor">
-            <a:schemeClr val="lt1"/>
-          </a:fontRef>
-        </p:style>
-        <p:txBody>
-          <a:bodyPr rtlCol="0" anchor="ctr"/>
-          <a:lstStyle/>
-          <a:p>
-            <a:pPr algn="ctr"/>
-            <a:endParaRPr lang="en-US"/>
-          </a:p>
-        </p:txBody>
-      </p:sp>
-      <p:sp>
-        <p:nvSpPr>
-          <p:cNvPr id="30" name="TextBox 29"/>
-          <p:cNvSpPr txBox="1"/>
-          <p:nvPr/>
-        </p:nvSpPr>
-        <p:spPr>
-          <a:xfrm flipH="1">
-            <a:off x="755360" y="5369349"/>
-            <a:ext cx="1421703" cy="861774"/>
-          </a:xfrm>
-          <a:prstGeom prst="rect">
-            <a:avLst/>
-          </a:prstGeom>
-          <a:noFill/>
-        </p:spPr>
-        <p:txBody>
-          <a:bodyPr wrap="square" rtlCol="0">
-            <a:spAutoFit/>
-          </a:bodyPr>
-          <a:lstStyle/>
-          <a:p>
-            <a:r>
-              <a:rPr lang="en-US" sz="5000" dirty="0" smtClean="0">
+          </p:spPr>
+          <p:txBody>
+            <a:bodyPr wrap="square" rtlCol="0">
+              <a:spAutoFit/>
+            </a:bodyPr>
+            <a:lstStyle/>
+            <a:p>
+              <a:r>
+                <a:rPr lang="en-US" sz="5000" dirty="0" smtClean="0">
+                  <a:solidFill>
+                    <a:schemeClr val="bg1"/>
+                  </a:solidFill>
+                  <a:latin typeface="Vera Humana 95" charset="0"/>
+                  <a:ea typeface="Vera Humana 95" charset="0"/>
+                  <a:cs typeface="Vera Humana 95" charset="0"/>
+                </a:rPr>
+                <a:t>GEC</a:t>
+              </a:r>
+              <a:endParaRPr lang="en-US" sz="5000" dirty="0">
                 <a:solidFill>
                   <a:schemeClr val="bg1"/>
                 </a:solidFill>
                 <a:latin typeface="Vera Humana 95" charset="0"/>
                 <a:ea typeface="Vera Humana 95" charset="0"/>
                 <a:cs typeface="Vera Humana 95" charset="0"/>
-              </a:rPr>
-              <a:t>GEC</a:t>
-            </a:r>
-            <a:endParaRPr lang="en-US" sz="5000" dirty="0">
-              <a:solidFill>
-                <a:schemeClr val="bg1"/>
-              </a:solidFill>
-              <a:latin typeface="Vera Humana 95" charset="0"/>
-              <a:ea typeface="Vera Humana 95" charset="0"/>
-              <a:cs typeface="Vera Humana 95" charset="0"/>
-            </a:endParaRPr>
-          </a:p>
-        </p:txBody>
-      </p:sp>
+              </a:endParaRPr>
+            </a:p>
+          </p:txBody>
+        </p:sp>
+      </p:grpSp>
     </p:spTree>
     <p:extLst>
       <p:ext uri="{BB962C8B-B14F-4D97-AF65-F5344CB8AC3E}">

</xml_diff>

<commit_message>
Syllabus Filter for HSS and CMS
</commit_message>
<xml_diff>
--- a/docs/department logos.pptx
+++ b/docs/department logos.pptx
@@ -162,10 +162,9 @@
           <a:lstStyle/>
           <a:p>
             <a:r>
-              <a:rPr lang="en-US" smtClean="0"/>
+              <a:rPr lang="en-US"/>
               <a:t>Click to edit Master title style</a:t>
             </a:r>
-            <a:endParaRPr lang="en-US"/>
           </a:p>
         </p:txBody>
       </p:sp>
@@ -281,10 +280,9 @@
           </a:lstStyle>
           <a:p>
             <a:r>
-              <a:rPr lang="en-US" smtClean="0"/>
+              <a:rPr lang="en-US"/>
               <a:t>Click to edit Master subtitle style</a:t>
             </a:r>
-            <a:endParaRPr lang="en-US"/>
           </a:p>
         </p:txBody>
       </p:sp>
@@ -305,7 +303,7 @@
           <a:p>
             <a:fld id="{0897BCBE-A2DD-2248-8676-657FEEB74689}" type="datetimeFigureOut">
               <a:rPr lang="en-US" smtClean="0"/>
-              <a:t>3/11/19</a:t>
+              <a:t>7/16/20</a:t>
             </a:fld>
             <a:endParaRPr lang="en-US"/>
           </a:p>
@@ -399,10 +397,9 @@
           <a:lstStyle/>
           <a:p>
             <a:r>
-              <a:rPr lang="en-US" smtClean="0"/>
+              <a:rPr lang="en-US"/>
               <a:t>Click to edit Master title style</a:t>
             </a:r>
-            <a:endParaRPr lang="en-US"/>
           </a:p>
         </p:txBody>
       </p:sp>
@@ -423,38 +420,37 @@
           <a:p>
             <a:pPr lvl="0"/>
             <a:r>
-              <a:rPr lang="en-US" smtClean="0"/>
+              <a:rPr lang="en-US"/>
               <a:t>Click to edit Master text styles</a:t>
             </a:r>
           </a:p>
           <a:p>
             <a:pPr lvl="1"/>
             <a:r>
-              <a:rPr lang="en-US" smtClean="0"/>
+              <a:rPr lang="en-US"/>
               <a:t>Second level</a:t>
             </a:r>
           </a:p>
           <a:p>
             <a:pPr lvl="2"/>
             <a:r>
-              <a:rPr lang="en-US" smtClean="0"/>
+              <a:rPr lang="en-US"/>
               <a:t>Third level</a:t>
             </a:r>
           </a:p>
           <a:p>
             <a:pPr lvl="3"/>
             <a:r>
-              <a:rPr lang="en-US" smtClean="0"/>
+              <a:rPr lang="en-US"/>
               <a:t>Fourth level</a:t>
             </a:r>
           </a:p>
           <a:p>
             <a:pPr lvl="4"/>
             <a:r>
-              <a:rPr lang="en-US" smtClean="0"/>
+              <a:rPr lang="en-US"/>
               <a:t>Fifth level</a:t>
             </a:r>
-            <a:endParaRPr lang="en-US"/>
           </a:p>
         </p:txBody>
       </p:sp>
@@ -475,7 +471,7 @@
           <a:p>
             <a:fld id="{0897BCBE-A2DD-2248-8676-657FEEB74689}" type="datetimeFigureOut">
               <a:rPr lang="en-US" smtClean="0"/>
-              <a:t>3/11/19</a:t>
+              <a:t>7/16/20</a:t>
             </a:fld>
             <a:endParaRPr lang="en-US"/>
           </a:p>
@@ -574,10 +570,9 @@
           <a:lstStyle/>
           <a:p>
             <a:r>
-              <a:rPr lang="en-US" smtClean="0"/>
+              <a:rPr lang="en-US"/>
               <a:t>Click to edit Master title style</a:t>
             </a:r>
-            <a:endParaRPr lang="en-US"/>
           </a:p>
         </p:txBody>
       </p:sp>
@@ -603,38 +598,37 @@
           <a:p>
             <a:pPr lvl="0"/>
             <a:r>
-              <a:rPr lang="en-US" smtClean="0"/>
+              <a:rPr lang="en-US"/>
               <a:t>Click to edit Master text styles</a:t>
             </a:r>
           </a:p>
           <a:p>
             <a:pPr lvl="1"/>
             <a:r>
-              <a:rPr lang="en-US" smtClean="0"/>
+              <a:rPr lang="en-US"/>
               <a:t>Second level</a:t>
             </a:r>
           </a:p>
           <a:p>
             <a:pPr lvl="2"/>
             <a:r>
-              <a:rPr lang="en-US" smtClean="0"/>
+              <a:rPr lang="en-US"/>
               <a:t>Third level</a:t>
             </a:r>
           </a:p>
           <a:p>
             <a:pPr lvl="3"/>
             <a:r>
-              <a:rPr lang="en-US" smtClean="0"/>
+              <a:rPr lang="en-US"/>
               <a:t>Fourth level</a:t>
             </a:r>
           </a:p>
           <a:p>
             <a:pPr lvl="4"/>
             <a:r>
-              <a:rPr lang="en-US" smtClean="0"/>
+              <a:rPr lang="en-US"/>
               <a:t>Fifth level</a:t>
             </a:r>
-            <a:endParaRPr lang="en-US"/>
           </a:p>
         </p:txBody>
       </p:sp>
@@ -655,7 +649,7 @@
           <a:p>
             <a:fld id="{0897BCBE-A2DD-2248-8676-657FEEB74689}" type="datetimeFigureOut">
               <a:rPr lang="en-US" smtClean="0"/>
-              <a:t>3/11/19</a:t>
+              <a:t>7/16/20</a:t>
             </a:fld>
             <a:endParaRPr lang="en-US"/>
           </a:p>
@@ -749,10 +743,9 @@
           <a:lstStyle/>
           <a:p>
             <a:r>
-              <a:rPr lang="en-US" smtClean="0"/>
+              <a:rPr lang="en-US"/>
               <a:t>Click to edit Master title style</a:t>
             </a:r>
-            <a:endParaRPr lang="en-US"/>
           </a:p>
         </p:txBody>
       </p:sp>
@@ -773,38 +766,37 @@
           <a:p>
             <a:pPr lvl="0"/>
             <a:r>
-              <a:rPr lang="en-US" smtClean="0"/>
+              <a:rPr lang="en-US"/>
               <a:t>Click to edit Master text styles</a:t>
             </a:r>
           </a:p>
           <a:p>
             <a:pPr lvl="1"/>
             <a:r>
-              <a:rPr lang="en-US" smtClean="0"/>
+              <a:rPr lang="en-US"/>
               <a:t>Second level</a:t>
             </a:r>
           </a:p>
           <a:p>
             <a:pPr lvl="2"/>
             <a:r>
-              <a:rPr lang="en-US" smtClean="0"/>
+              <a:rPr lang="en-US"/>
               <a:t>Third level</a:t>
             </a:r>
           </a:p>
           <a:p>
             <a:pPr lvl="3"/>
             <a:r>
-              <a:rPr lang="en-US" smtClean="0"/>
+              <a:rPr lang="en-US"/>
               <a:t>Fourth level</a:t>
             </a:r>
           </a:p>
           <a:p>
             <a:pPr lvl="4"/>
             <a:r>
-              <a:rPr lang="en-US" smtClean="0"/>
+              <a:rPr lang="en-US"/>
               <a:t>Fifth level</a:t>
             </a:r>
-            <a:endParaRPr lang="en-US"/>
           </a:p>
         </p:txBody>
       </p:sp>
@@ -825,7 +817,7 @@
           <a:p>
             <a:fld id="{0897BCBE-A2DD-2248-8676-657FEEB74689}" type="datetimeFigureOut">
               <a:rPr lang="en-US" smtClean="0"/>
-              <a:t>3/11/19</a:t>
+              <a:t>7/16/20</a:t>
             </a:fld>
             <a:endParaRPr lang="en-US"/>
           </a:p>
@@ -928,10 +920,9 @@
           </a:lstStyle>
           <a:p>
             <a:r>
-              <a:rPr lang="en-US" smtClean="0"/>
+              <a:rPr lang="en-US"/>
               <a:t>Click to edit Master title style</a:t>
             </a:r>
-            <a:endParaRPr lang="en-US"/>
           </a:p>
         </p:txBody>
       </p:sp>
@@ -1048,7 +1039,7 @@
           <a:p>
             <a:pPr lvl="0"/>
             <a:r>
-              <a:rPr lang="en-US" smtClean="0"/>
+              <a:rPr lang="en-US"/>
               <a:t>Click to edit Master text styles</a:t>
             </a:r>
           </a:p>
@@ -1071,7 +1062,7 @@
           <a:p>
             <a:fld id="{0897BCBE-A2DD-2248-8676-657FEEB74689}" type="datetimeFigureOut">
               <a:rPr lang="en-US" smtClean="0"/>
-              <a:t>3/11/19</a:t>
+              <a:t>7/16/20</a:t>
             </a:fld>
             <a:endParaRPr lang="en-US"/>
           </a:p>
@@ -1165,10 +1156,9 @@
           <a:lstStyle/>
           <a:p>
             <a:r>
-              <a:rPr lang="en-US" smtClean="0"/>
+              <a:rPr lang="en-US"/>
               <a:t>Click to edit Master title style</a:t>
             </a:r>
-            <a:endParaRPr lang="en-US"/>
           </a:p>
         </p:txBody>
       </p:sp>
@@ -1222,38 +1212,37 @@
           <a:p>
             <a:pPr lvl="0"/>
             <a:r>
-              <a:rPr lang="en-US" smtClean="0"/>
+              <a:rPr lang="en-US"/>
               <a:t>Click to edit Master text styles</a:t>
             </a:r>
           </a:p>
           <a:p>
             <a:pPr lvl="1"/>
             <a:r>
-              <a:rPr lang="en-US" smtClean="0"/>
+              <a:rPr lang="en-US"/>
               <a:t>Second level</a:t>
             </a:r>
           </a:p>
           <a:p>
             <a:pPr lvl="2"/>
             <a:r>
-              <a:rPr lang="en-US" smtClean="0"/>
+              <a:rPr lang="en-US"/>
               <a:t>Third level</a:t>
             </a:r>
           </a:p>
           <a:p>
             <a:pPr lvl="3"/>
             <a:r>
-              <a:rPr lang="en-US" smtClean="0"/>
+              <a:rPr lang="en-US"/>
               <a:t>Fourth level</a:t>
             </a:r>
           </a:p>
           <a:p>
             <a:pPr lvl="4"/>
             <a:r>
-              <a:rPr lang="en-US" smtClean="0"/>
+              <a:rPr lang="en-US"/>
               <a:t>Fifth level</a:t>
             </a:r>
-            <a:endParaRPr lang="en-US"/>
           </a:p>
         </p:txBody>
       </p:sp>
@@ -1307,38 +1296,37 @@
           <a:p>
             <a:pPr lvl="0"/>
             <a:r>
-              <a:rPr lang="en-US" smtClean="0"/>
+              <a:rPr lang="en-US"/>
               <a:t>Click to edit Master text styles</a:t>
             </a:r>
           </a:p>
           <a:p>
             <a:pPr lvl="1"/>
             <a:r>
-              <a:rPr lang="en-US" smtClean="0"/>
+              <a:rPr lang="en-US"/>
               <a:t>Second level</a:t>
             </a:r>
           </a:p>
           <a:p>
             <a:pPr lvl="2"/>
             <a:r>
-              <a:rPr lang="en-US" smtClean="0"/>
+              <a:rPr lang="en-US"/>
               <a:t>Third level</a:t>
             </a:r>
           </a:p>
           <a:p>
             <a:pPr lvl="3"/>
             <a:r>
-              <a:rPr lang="en-US" smtClean="0"/>
+              <a:rPr lang="en-US"/>
               <a:t>Fourth level</a:t>
             </a:r>
           </a:p>
           <a:p>
             <a:pPr lvl="4"/>
             <a:r>
-              <a:rPr lang="en-US" smtClean="0"/>
+              <a:rPr lang="en-US"/>
               <a:t>Fifth level</a:t>
             </a:r>
-            <a:endParaRPr lang="en-US"/>
           </a:p>
         </p:txBody>
       </p:sp>
@@ -1359,7 +1347,7 @@
           <a:p>
             <a:fld id="{0897BCBE-A2DD-2248-8676-657FEEB74689}" type="datetimeFigureOut">
               <a:rPr lang="en-US" smtClean="0"/>
-              <a:t>3/11/19</a:t>
+              <a:t>7/16/20</a:t>
             </a:fld>
             <a:endParaRPr lang="en-US"/>
           </a:p>
@@ -1457,10 +1445,9 @@
           </a:lstStyle>
           <a:p>
             <a:r>
-              <a:rPr lang="en-US" smtClean="0"/>
+              <a:rPr lang="en-US"/>
               <a:t>Click to edit Master title style</a:t>
             </a:r>
-            <a:endParaRPr lang="en-US"/>
           </a:p>
         </p:txBody>
       </p:sp>
@@ -1523,7 +1510,7 @@
           <a:p>
             <a:pPr lvl="0"/>
             <a:r>
-              <a:rPr lang="en-US" smtClean="0"/>
+              <a:rPr lang="en-US"/>
               <a:t>Click to edit Master text styles</a:t>
             </a:r>
           </a:p>
@@ -1579,38 +1566,37 @@
           <a:p>
             <a:pPr lvl="0"/>
             <a:r>
-              <a:rPr lang="en-US" smtClean="0"/>
+              <a:rPr lang="en-US"/>
               <a:t>Click to edit Master text styles</a:t>
             </a:r>
           </a:p>
           <a:p>
             <a:pPr lvl="1"/>
             <a:r>
-              <a:rPr lang="en-US" smtClean="0"/>
+              <a:rPr lang="en-US"/>
               <a:t>Second level</a:t>
             </a:r>
           </a:p>
           <a:p>
             <a:pPr lvl="2"/>
             <a:r>
-              <a:rPr lang="en-US" smtClean="0"/>
+              <a:rPr lang="en-US"/>
               <a:t>Third level</a:t>
             </a:r>
           </a:p>
           <a:p>
             <a:pPr lvl="3"/>
             <a:r>
-              <a:rPr lang="en-US" smtClean="0"/>
+              <a:rPr lang="en-US"/>
               <a:t>Fourth level</a:t>
             </a:r>
           </a:p>
           <a:p>
             <a:pPr lvl="4"/>
             <a:r>
-              <a:rPr lang="en-US" smtClean="0"/>
+              <a:rPr lang="en-US"/>
               <a:t>Fifth level</a:t>
             </a:r>
-            <a:endParaRPr lang="en-US"/>
           </a:p>
         </p:txBody>
       </p:sp>
@@ -1673,7 +1659,7 @@
           <a:p>
             <a:pPr lvl="0"/>
             <a:r>
-              <a:rPr lang="en-US" smtClean="0"/>
+              <a:rPr lang="en-US"/>
               <a:t>Click to edit Master text styles</a:t>
             </a:r>
           </a:p>
@@ -1729,38 +1715,37 @@
           <a:p>
             <a:pPr lvl="0"/>
             <a:r>
-              <a:rPr lang="en-US" smtClean="0"/>
+              <a:rPr lang="en-US"/>
               <a:t>Click to edit Master text styles</a:t>
             </a:r>
           </a:p>
           <a:p>
             <a:pPr lvl="1"/>
             <a:r>
-              <a:rPr lang="en-US" smtClean="0"/>
+              <a:rPr lang="en-US"/>
               <a:t>Second level</a:t>
             </a:r>
           </a:p>
           <a:p>
             <a:pPr lvl="2"/>
             <a:r>
-              <a:rPr lang="en-US" smtClean="0"/>
+              <a:rPr lang="en-US"/>
               <a:t>Third level</a:t>
             </a:r>
           </a:p>
           <a:p>
             <a:pPr lvl="3"/>
             <a:r>
-              <a:rPr lang="en-US" smtClean="0"/>
+              <a:rPr lang="en-US"/>
               <a:t>Fourth level</a:t>
             </a:r>
           </a:p>
           <a:p>
             <a:pPr lvl="4"/>
             <a:r>
-              <a:rPr lang="en-US" smtClean="0"/>
+              <a:rPr lang="en-US"/>
               <a:t>Fifth level</a:t>
             </a:r>
-            <a:endParaRPr lang="en-US"/>
           </a:p>
         </p:txBody>
       </p:sp>
@@ -1781,7 +1766,7 @@
           <a:p>
             <a:fld id="{0897BCBE-A2DD-2248-8676-657FEEB74689}" type="datetimeFigureOut">
               <a:rPr lang="en-US" smtClean="0"/>
-              <a:t>3/11/19</a:t>
+              <a:t>7/16/20</a:t>
             </a:fld>
             <a:endParaRPr lang="en-US"/>
           </a:p>
@@ -1875,10 +1860,9 @@
           <a:lstStyle/>
           <a:p>
             <a:r>
-              <a:rPr lang="en-US" smtClean="0"/>
+              <a:rPr lang="en-US"/>
               <a:t>Click to edit Master title style</a:t>
             </a:r>
-            <a:endParaRPr lang="en-US"/>
           </a:p>
         </p:txBody>
       </p:sp>
@@ -1899,7 +1883,7 @@
           <a:p>
             <a:fld id="{0897BCBE-A2DD-2248-8676-657FEEB74689}" type="datetimeFigureOut">
               <a:rPr lang="en-US" smtClean="0"/>
-              <a:t>3/11/19</a:t>
+              <a:t>7/16/20</a:t>
             </a:fld>
             <a:endParaRPr lang="en-US"/>
           </a:p>
@@ -1994,7 +1978,7 @@
           <a:p>
             <a:fld id="{0897BCBE-A2DD-2248-8676-657FEEB74689}" type="datetimeFigureOut">
               <a:rPr lang="en-US" smtClean="0"/>
-              <a:t>3/11/19</a:t>
+              <a:t>7/16/20</a:t>
             </a:fld>
             <a:endParaRPr lang="en-US"/>
           </a:p>
@@ -2097,10 +2081,9 @@
           </a:lstStyle>
           <a:p>
             <a:r>
-              <a:rPr lang="en-US" smtClean="0"/>
+              <a:rPr lang="en-US"/>
               <a:t>Click to edit Master title style</a:t>
             </a:r>
-            <a:endParaRPr lang="en-US"/>
           </a:p>
         </p:txBody>
       </p:sp>
@@ -2154,38 +2137,37 @@
           <a:p>
             <a:pPr lvl="0"/>
             <a:r>
-              <a:rPr lang="en-US" smtClean="0"/>
+              <a:rPr lang="en-US"/>
               <a:t>Click to edit Master text styles</a:t>
             </a:r>
           </a:p>
           <a:p>
             <a:pPr lvl="1"/>
             <a:r>
-              <a:rPr lang="en-US" smtClean="0"/>
+              <a:rPr lang="en-US"/>
               <a:t>Second level</a:t>
             </a:r>
           </a:p>
           <a:p>
             <a:pPr lvl="2"/>
             <a:r>
-              <a:rPr lang="en-US" smtClean="0"/>
+              <a:rPr lang="en-US"/>
               <a:t>Third level</a:t>
             </a:r>
           </a:p>
           <a:p>
             <a:pPr lvl="3"/>
             <a:r>
-              <a:rPr lang="en-US" smtClean="0"/>
+              <a:rPr lang="en-US"/>
               <a:t>Fourth level</a:t>
             </a:r>
           </a:p>
           <a:p>
             <a:pPr lvl="4"/>
             <a:r>
-              <a:rPr lang="en-US" smtClean="0"/>
+              <a:rPr lang="en-US"/>
               <a:t>Fifth level</a:t>
             </a:r>
-            <a:endParaRPr lang="en-US"/>
           </a:p>
         </p:txBody>
       </p:sp>
@@ -2248,7 +2230,7 @@
           <a:p>
             <a:pPr lvl="0"/>
             <a:r>
-              <a:rPr lang="en-US" smtClean="0"/>
+              <a:rPr lang="en-US"/>
               <a:t>Click to edit Master text styles</a:t>
             </a:r>
           </a:p>
@@ -2271,7 +2253,7 @@
           <a:p>
             <a:fld id="{0897BCBE-A2DD-2248-8676-657FEEB74689}" type="datetimeFigureOut">
               <a:rPr lang="en-US" smtClean="0"/>
-              <a:t>3/11/19</a:t>
+              <a:t>7/16/20</a:t>
             </a:fld>
             <a:endParaRPr lang="en-US"/>
           </a:p>
@@ -2374,10 +2356,9 @@
           </a:lstStyle>
           <a:p>
             <a:r>
-              <a:rPr lang="en-US" smtClean="0"/>
+              <a:rPr lang="en-US"/>
               <a:t>Click to edit Master title style</a:t>
             </a:r>
-            <a:endParaRPr lang="en-US"/>
           </a:p>
         </p:txBody>
       </p:sp>
@@ -2501,7 +2482,7 @@
           <a:p>
             <a:pPr lvl="0"/>
             <a:r>
-              <a:rPr lang="en-US" smtClean="0"/>
+              <a:rPr lang="en-US"/>
               <a:t>Click to edit Master text styles</a:t>
             </a:r>
           </a:p>
@@ -2524,7 +2505,7 @@
           <a:p>
             <a:fld id="{0897BCBE-A2DD-2248-8676-657FEEB74689}" type="datetimeFigureOut">
               <a:rPr lang="en-US" smtClean="0"/>
-              <a:t>3/11/19</a:t>
+              <a:t>7/16/20</a:t>
             </a:fld>
             <a:endParaRPr lang="en-US"/>
           </a:p>
@@ -2633,10 +2614,9 @@
           <a:lstStyle/>
           <a:p>
             <a:r>
-              <a:rPr lang="en-US" smtClean="0"/>
+              <a:rPr lang="en-US"/>
               <a:t>Click to edit Master title style</a:t>
             </a:r>
-            <a:endParaRPr lang="en-US"/>
           </a:p>
         </p:txBody>
       </p:sp>
@@ -2667,38 +2647,37 @@
           <a:p>
             <a:pPr lvl="0"/>
             <a:r>
-              <a:rPr lang="en-US" smtClean="0"/>
+              <a:rPr lang="en-US"/>
               <a:t>Click to edit Master text styles</a:t>
             </a:r>
           </a:p>
           <a:p>
             <a:pPr lvl="1"/>
             <a:r>
-              <a:rPr lang="en-US" smtClean="0"/>
+              <a:rPr lang="en-US"/>
               <a:t>Second level</a:t>
             </a:r>
           </a:p>
           <a:p>
             <a:pPr lvl="2"/>
             <a:r>
-              <a:rPr lang="en-US" smtClean="0"/>
+              <a:rPr lang="en-US"/>
               <a:t>Third level</a:t>
             </a:r>
           </a:p>
           <a:p>
             <a:pPr lvl="3"/>
             <a:r>
-              <a:rPr lang="en-US" smtClean="0"/>
+              <a:rPr lang="en-US"/>
               <a:t>Fourth level</a:t>
             </a:r>
           </a:p>
           <a:p>
             <a:pPr lvl="4"/>
             <a:r>
-              <a:rPr lang="en-US" smtClean="0"/>
+              <a:rPr lang="en-US"/>
               <a:t>Fifth level</a:t>
             </a:r>
-            <a:endParaRPr lang="en-US"/>
           </a:p>
         </p:txBody>
       </p:sp>
@@ -2737,7 +2716,7 @@
           <a:p>
             <a:fld id="{0897BCBE-A2DD-2248-8676-657FEEB74689}" type="datetimeFigureOut">
               <a:rPr lang="en-US" smtClean="0"/>
-              <a:t>3/11/19</a:t>
+              <a:t>7/16/20</a:t>
             </a:fld>
             <a:endParaRPr lang="en-US"/>
           </a:p>
@@ -3180,7 +3159,7 @@
           <a:lstStyle/>
           <a:p>
             <a:r>
-              <a:rPr lang="en-US" sz="8000" dirty="0" smtClean="0">
+              <a:rPr lang="en-US" sz="8000" dirty="0">
                 <a:solidFill>
                   <a:schemeClr val="bg1"/>
                 </a:solidFill>
@@ -3190,14 +3169,6 @@
               </a:rPr>
               <a:t>WT</a:t>
             </a:r>
-            <a:endParaRPr lang="en-US" sz="8000" dirty="0">
-              <a:solidFill>
-                <a:schemeClr val="bg1"/>
-              </a:solidFill>
-              <a:latin typeface="Vera Humana 95" charset="0"/>
-              <a:ea typeface="Vera Humana 95" charset="0"/>
-              <a:cs typeface="Vera Humana 95" charset="0"/>
-            </a:endParaRPr>
           </a:p>
         </p:txBody>
       </p:sp>
@@ -3224,7 +3195,7 @@
           <a:lstStyle/>
           <a:p>
             <a:r>
-              <a:rPr lang="en-US" sz="3000" dirty="0" smtClean="0">
+              <a:rPr lang="en-US" sz="3000" dirty="0">
                 <a:solidFill>
                   <a:schemeClr val="bg1"/>
                 </a:solidFill>
@@ -3234,14 +3205,6 @@
               </a:rPr>
               <a:t>WaseTime</a:t>
             </a:r>
-            <a:endParaRPr lang="en-US" sz="3000" dirty="0">
-              <a:solidFill>
-                <a:schemeClr val="bg1"/>
-              </a:solidFill>
-              <a:latin typeface="Vera Humana 95" charset="0"/>
-              <a:ea typeface="Vera Humana 95" charset="0"/>
-              <a:cs typeface="Vera Humana 95" charset="0"/>
-            </a:endParaRPr>
           </a:p>
         </p:txBody>
       </p:sp>
@@ -3267,16 +3230,12 @@
           <a:lstStyle/>
           <a:p>
             <a:r>
-              <a:rPr lang="en-US" dirty="0" err="1" smtClean="0"/>
+              <a:rPr lang="en-US" dirty="0" err="1"/>
               <a:t>Rgb</a:t>
             </a:r>
             <a:r>
-              <a:rPr lang="en-US" dirty="0" smtClean="0"/>
-              <a:t>: 140 </a:t>
-            </a:r>
-            <a:r>
               <a:rPr lang="en-US" dirty="0"/>
-              <a:t>25 43</a:t>
+              <a:t>: 140 25 43</a:t>
             </a:r>
           </a:p>
         </p:txBody>
@@ -3363,7 +3322,7 @@
             <a:lstStyle/>
             <a:p>
               <a:r>
-                <a:rPr lang="en-US" sz="10400" dirty="0" smtClean="0">
+                <a:rPr lang="en-US" sz="10400" dirty="0">
                   <a:solidFill>
                     <a:schemeClr val="bg1"/>
                   </a:solidFill>
@@ -3373,14 +3332,6 @@
                 </a:rPr>
                 <a:t>WT</a:t>
               </a:r>
-              <a:endParaRPr lang="en-US" sz="10400" dirty="0">
-                <a:solidFill>
-                  <a:schemeClr val="bg1"/>
-                </a:solidFill>
-                <a:latin typeface="Vera Humana 95" charset="0"/>
-                <a:ea typeface="Vera Humana 95" charset="0"/>
-                <a:cs typeface="Vera Humana 95" charset="0"/>
-              </a:endParaRPr>
             </a:p>
           </p:txBody>
         </p:sp>
@@ -3453,7 +3404,7 @@
           <a:lstStyle/>
           <a:p>
             <a:r>
-              <a:rPr lang="en-US" sz="5000" dirty="0" smtClean="0">
+              <a:rPr lang="en-US" sz="5000" dirty="0">
                 <a:solidFill>
                   <a:schemeClr val="bg1"/>
                 </a:solidFill>
@@ -3463,14 +3414,6 @@
               </a:rPr>
               <a:t>FSE</a:t>
             </a:r>
-            <a:endParaRPr lang="en-US" sz="5000" dirty="0">
-              <a:solidFill>
-                <a:schemeClr val="bg1"/>
-              </a:solidFill>
-              <a:latin typeface="Vera Humana 95" charset="0"/>
-              <a:ea typeface="Vera Humana 95" charset="0"/>
-              <a:cs typeface="Vera Humana 95" charset="0"/>
-            </a:endParaRPr>
           </a:p>
         </p:txBody>
       </p:sp>
@@ -3526,7 +3469,7 @@
         </p:blipFill>
         <p:spPr>
           <a:xfrm>
-            <a:off x="1992125" y="463160"/>
+            <a:off x="2416539" y="506744"/>
             <a:ext cx="2762250" cy="2762250"/>
           </a:xfrm>
           <a:prstGeom prst="rect">
@@ -3556,7 +3499,7 @@
         </p:blipFill>
         <p:spPr>
           <a:xfrm>
-            <a:off x="-455714" y="615339"/>
+            <a:off x="-272515" y="626845"/>
             <a:ext cx="2762250" cy="2762250"/>
           </a:xfrm>
           <a:prstGeom prst="rect">
@@ -3640,27 +3583,8 @@
                 <a:ea typeface="Vera Humana 95" charset="0"/>
                 <a:cs typeface="Vera Humana 95" charset="0"/>
               </a:rPr>
-              <a:t>C</a:t>
-            </a:r>
-            <a:r>
-              <a:rPr lang="en-US" sz="5000" dirty="0" smtClean="0">
-                <a:solidFill>
-                  <a:schemeClr val="bg1"/>
-                </a:solidFill>
-                <a:latin typeface="Vera Humana 95" charset="0"/>
-                <a:ea typeface="Vera Humana 95" charset="0"/>
-                <a:cs typeface="Vera Humana 95" charset="0"/>
-              </a:rPr>
-              <a:t>SE</a:t>
-            </a:r>
-            <a:endParaRPr lang="en-US" sz="5000" dirty="0">
-              <a:solidFill>
-                <a:schemeClr val="bg1"/>
-              </a:solidFill>
-              <a:latin typeface="Vera Humana 95" charset="0"/>
-              <a:ea typeface="Vera Humana 95" charset="0"/>
-              <a:cs typeface="Vera Humana 95" charset="0"/>
-            </a:endParaRPr>
+              <a:t>CSE</a:t>
+            </a:r>
           </a:p>
         </p:txBody>
       </p:sp>
@@ -3732,7 +3656,7 @@
           <a:lstStyle/>
           <a:p>
             <a:r>
-              <a:rPr lang="en-US" sz="5000" dirty="0" smtClean="0">
+              <a:rPr lang="en-US" sz="5000" dirty="0">
                 <a:solidFill>
                   <a:schemeClr val="bg1"/>
                 </a:solidFill>
@@ -3740,27 +3664,8 @@
                 <a:ea typeface="Vera Humana 95" charset="0"/>
                 <a:cs typeface="Vera Humana 95" charset="0"/>
               </a:rPr>
-              <a:t>A</a:t>
-            </a:r>
-            <a:r>
-              <a:rPr lang="en-US" sz="5000" smtClean="0">
-                <a:solidFill>
-                  <a:schemeClr val="bg1"/>
-                </a:solidFill>
-                <a:latin typeface="Vera Humana 95" charset="0"/>
-                <a:ea typeface="Vera Humana 95" charset="0"/>
-                <a:cs typeface="Vera Humana 95" charset="0"/>
-              </a:rPr>
-              <a:t>SE</a:t>
-            </a:r>
-            <a:endParaRPr lang="en-US" sz="5000" dirty="0">
-              <a:solidFill>
-                <a:schemeClr val="bg1"/>
-              </a:solidFill>
-              <a:latin typeface="Vera Humana 95" charset="0"/>
-              <a:ea typeface="Vera Humana 95" charset="0"/>
-              <a:cs typeface="Vera Humana 95" charset="0"/>
-            </a:endParaRPr>
+              <a:t>ASE</a:t>
+            </a:r>
           </a:p>
         </p:txBody>
       </p:sp>
@@ -3854,27 +3759,8 @@
                   <a:ea typeface="Vera Humana 95" charset="0"/>
                   <a:cs typeface="Vera Humana 95" charset="0"/>
                 </a:rPr>
-                <a:t>P</a:t>
+                <a:t>PSE</a:t>
               </a:r>
-              <a:r>
-                <a:rPr lang="en-US" sz="5000" dirty="0" smtClean="0">
-                  <a:solidFill>
-                    <a:schemeClr val="bg1"/>
-                  </a:solidFill>
-                  <a:latin typeface="Vera Humana 95" charset="0"/>
-                  <a:ea typeface="Vera Humana 95" charset="0"/>
-                  <a:cs typeface="Vera Humana 95" charset="0"/>
-                </a:rPr>
-                <a:t>SE</a:t>
-              </a:r>
-              <a:endParaRPr lang="en-US" sz="5000" dirty="0">
-                <a:solidFill>
-                  <a:schemeClr val="bg1"/>
-                </a:solidFill>
-                <a:latin typeface="Vera Humana 95" charset="0"/>
-                <a:ea typeface="Vera Humana 95" charset="0"/>
-                <a:cs typeface="Vera Humana 95" charset="0"/>
-              </a:endParaRPr>
             </a:p>
           </p:txBody>
         </p:sp>
@@ -3961,7 +3847,7 @@
             <a:lstStyle/>
             <a:p>
               <a:r>
-                <a:rPr lang="en-US" sz="5000" dirty="0" smtClean="0">
+                <a:rPr lang="en-US" sz="5000" dirty="0">
                   <a:solidFill>
                     <a:schemeClr val="bg1"/>
                   </a:solidFill>
@@ -3971,14 +3857,6 @@
                 </a:rPr>
                 <a:t>CJL</a:t>
               </a:r>
-              <a:endParaRPr lang="en-US" sz="5000" dirty="0">
-                <a:solidFill>
-                  <a:schemeClr val="bg1"/>
-                </a:solidFill>
-                <a:latin typeface="Vera Humana 95" charset="0"/>
-                <a:ea typeface="Vera Humana 95" charset="0"/>
-                <a:cs typeface="Vera Humana 95" charset="0"/>
-              </a:endParaRPr>
             </a:p>
           </p:txBody>
         </p:sp>
@@ -4065,7 +3943,7 @@
             <a:lstStyle/>
             <a:p>
               <a:r>
-                <a:rPr lang="en-US" sz="5000" dirty="0" smtClean="0">
+                <a:rPr lang="en-US" sz="5000" dirty="0">
                   <a:solidFill>
                     <a:schemeClr val="bg1"/>
                   </a:solidFill>
@@ -4075,14 +3953,6 @@
                 </a:rPr>
                 <a:t>SILS</a:t>
               </a:r>
-              <a:endParaRPr lang="en-US" sz="5000" dirty="0">
-                <a:solidFill>
-                  <a:schemeClr val="bg1"/>
-                </a:solidFill>
-                <a:latin typeface="Vera Humana 95" charset="0"/>
-                <a:ea typeface="Vera Humana 95" charset="0"/>
-                <a:cs typeface="Vera Humana 95" charset="0"/>
-              </a:endParaRPr>
             </a:p>
           </p:txBody>
         </p:sp>
@@ -4169,7 +4039,7 @@
             <a:lstStyle/>
             <a:p>
               <a:r>
-                <a:rPr lang="en-US" sz="5000" dirty="0" smtClean="0">
+                <a:rPr lang="en-US" sz="5000" dirty="0">
                   <a:solidFill>
                     <a:schemeClr val="bg1"/>
                   </a:solidFill>
@@ -4179,14 +4049,120 @@
                 </a:rPr>
                 <a:t>GEC</a:t>
               </a:r>
-              <a:endParaRPr lang="en-US" sz="5000" dirty="0">
-                <a:solidFill>
-                  <a:schemeClr val="bg1"/>
-                </a:solidFill>
-                <a:latin typeface="Vera Humana 95" charset="0"/>
-                <a:ea typeface="Vera Humana 95" charset="0"/>
-                <a:cs typeface="Vera Humana 95" charset="0"/>
-              </a:endParaRPr>
+            </a:p>
+          </p:txBody>
+        </p:sp>
+      </p:grpSp>
+      <p:grpSp>
+        <p:nvGrpSpPr>
+          <p:cNvPr id="31" name="Group 14">
+            <a:extLst>
+              <a:ext uri="{FF2B5EF4-FFF2-40B4-BE49-F238E27FC236}">
+                <a16:creationId xmlns:a16="http://schemas.microsoft.com/office/drawing/2014/main" id="{9584289A-88F6-4342-8967-40BA0271BC1D}"/>
+              </a:ext>
+            </a:extLst>
+          </p:cNvPr>
+          <p:cNvGrpSpPr/>
+          <p:nvPr/>
+        </p:nvGrpSpPr>
+        <p:grpSpPr>
+          <a:xfrm>
+            <a:off x="7332421" y="3994000"/>
+            <a:ext cx="1421703" cy="1080000"/>
+            <a:chOff x="755360" y="5237996"/>
+            <a:chExt cx="1421703" cy="1080000"/>
+          </a:xfrm>
+        </p:grpSpPr>
+        <p:sp>
+          <p:nvSpPr>
+            <p:cNvPr id="32" name="Rectangle 28">
+              <a:extLst>
+                <a:ext uri="{FF2B5EF4-FFF2-40B4-BE49-F238E27FC236}">
+                  <a16:creationId xmlns:a16="http://schemas.microsoft.com/office/drawing/2014/main" id="{DE955507-7FD2-C440-92EA-035420F8B87E}"/>
+                </a:ext>
+              </a:extLst>
+            </p:cNvPr>
+            <p:cNvSpPr/>
+            <p:nvPr/>
+          </p:nvSpPr>
+          <p:spPr>
+            <a:xfrm rot="2700000">
+              <a:off x="930924" y="5237996"/>
+              <a:ext cx="1080000" cy="1080000"/>
+            </a:xfrm>
+            <a:prstGeom prst="rect">
+              <a:avLst/>
+            </a:prstGeom>
+            <a:solidFill>
+              <a:srgbClr val="3D985C"/>
+            </a:solidFill>
+            <a:ln>
+              <a:noFill/>
+            </a:ln>
+            <a:effectLst/>
+          </p:spPr>
+          <p:style>
+            <a:lnRef idx="1">
+              <a:schemeClr val="accent1"/>
+            </a:lnRef>
+            <a:fillRef idx="3">
+              <a:schemeClr val="accent1"/>
+            </a:fillRef>
+            <a:effectRef idx="2">
+              <a:schemeClr val="accent1"/>
+            </a:effectRef>
+            <a:fontRef idx="minor">
+              <a:schemeClr val="lt1"/>
+            </a:fontRef>
+          </p:style>
+          <p:txBody>
+            <a:bodyPr rtlCol="0" anchor="ctr"/>
+            <a:lstStyle/>
+            <a:p>
+              <a:pPr algn="ctr"/>
+              <a:endParaRPr lang="en-US"/>
+            </a:p>
+          </p:txBody>
+        </p:sp>
+        <p:sp>
+          <p:nvSpPr>
+            <p:cNvPr id="33" name="TextBox 29">
+              <a:extLst>
+                <a:ext uri="{FF2B5EF4-FFF2-40B4-BE49-F238E27FC236}">
+                  <a16:creationId xmlns:a16="http://schemas.microsoft.com/office/drawing/2014/main" id="{A26031A4-2B21-AA4F-A609-D991C5C4FD71}"/>
+                </a:ext>
+              </a:extLst>
+            </p:cNvPr>
+            <p:cNvSpPr txBox="1"/>
+            <p:nvPr/>
+          </p:nvSpPr>
+          <p:spPr>
+            <a:xfrm flipH="1">
+              <a:off x="755360" y="5369349"/>
+              <a:ext cx="1421703" cy="861774"/>
+            </a:xfrm>
+            <a:prstGeom prst="rect">
+              <a:avLst/>
+            </a:prstGeom>
+            <a:noFill/>
+          </p:spPr>
+          <p:txBody>
+            <a:bodyPr wrap="square" rtlCol="0">
+              <a:spAutoFit/>
+            </a:bodyPr>
+            <a:lstStyle/>
+            <a:p>
+              <a:r>
+                <a:rPr lang="en-US" sz="5000" dirty="0">
+                  <a:solidFill>
+                    <a:schemeClr val="bg1"/>
+                  </a:solidFill>
+                  <a:latin typeface="Vera Humana 95" charset="0"/>
+                  <a:ea typeface="Vera Humana 95" charset="0"/>
+                  <a:cs typeface="Vera Humana 95" charset="0"/>
+                </a:rPr>
+                <a:t>GEC</a:t>
+              </a:r>
             </a:p>
           </p:txBody>
         </p:sp>
@@ -4229,7 +4205,7 @@
         </p:nvSpPr>
         <p:spPr>
           <a:xfrm rot="2700000">
-            <a:off x="3975880" y="4097024"/>
+            <a:off x="937112" y="3921557"/>
             <a:ext cx="1080000" cy="1080000"/>
           </a:xfrm>
           <a:prstGeom prst="rect">
@@ -4262,7 +4238,7 @@
           <a:lstStyle/>
           <a:p>
             <a:pPr algn="ctr"/>
-            <a:endParaRPr lang="en-US">
+            <a:endParaRPr lang="en-US" dirty="0">
               <a:solidFill>
                 <a:srgbClr val="E8FFFF"/>
               </a:solidFill>
@@ -4278,7 +4254,7 @@
         </p:nvSpPr>
         <p:spPr>
           <a:xfrm flipH="1">
-            <a:off x="3970249" y="4228377"/>
+            <a:off x="876832" y="4030670"/>
             <a:ext cx="1200560" cy="861774"/>
           </a:xfrm>
           <a:prstGeom prst="rect">
@@ -4293,7 +4269,7 @@
           <a:lstStyle/>
           <a:p>
             <a:r>
-              <a:rPr lang="en-US" sz="5000" dirty="0" smtClean="0">
+              <a:rPr lang="en-US" sz="5000" dirty="0">
                 <a:solidFill>
                   <a:schemeClr val="bg1"/>
                 </a:solidFill>
@@ -4303,14 +4279,6 @@
               </a:rPr>
               <a:t>SSS</a:t>
             </a:r>
-            <a:endParaRPr lang="en-US" sz="5000" dirty="0">
-              <a:solidFill>
-                <a:schemeClr val="bg1"/>
-              </a:solidFill>
-              <a:latin typeface="Vera Humana 95" charset="0"/>
-              <a:ea typeface="Vera Humana 95" charset="0"/>
-              <a:cs typeface="Vera Humana 95" charset="0"/>
-            </a:endParaRPr>
           </a:p>
         </p:txBody>
       </p:sp>
@@ -4355,6 +4323,316 @@
           </a:extLst>
         </p:spPr>
       </p:pic>
+      <p:pic>
+        <p:nvPicPr>
+          <p:cNvPr id="2" name="图片 1">
+            <a:extLst>
+              <a:ext uri="{FF2B5EF4-FFF2-40B4-BE49-F238E27FC236}">
+                <a16:creationId xmlns:a16="http://schemas.microsoft.com/office/drawing/2014/main" id="{F92E29F5-6D2C-7B45-9098-EBC51BFA4AE4}"/>
+              </a:ext>
+            </a:extLst>
+          </p:cNvPr>
+          <p:cNvPicPr>
+            <a:picLocks noChangeAspect="1"/>
+          </p:cNvPicPr>
+          <p:nvPr/>
+        </p:nvPicPr>
+        <p:blipFill>
+          <a:blip r:embed="rId3"/>
+          <a:stretch>
+            <a:fillRect/>
+          </a:stretch>
+        </p:blipFill>
+        <p:spPr>
+          <a:xfrm>
+            <a:off x="2833427" y="960746"/>
+            <a:ext cx="1905000" cy="1943100"/>
+          </a:xfrm>
+          <a:prstGeom prst="rect">
+            <a:avLst/>
+          </a:prstGeom>
+        </p:spPr>
+      </p:pic>
+      <p:grpSp>
+        <p:nvGrpSpPr>
+          <p:cNvPr id="7" name="Group 14">
+            <a:extLst>
+              <a:ext uri="{FF2B5EF4-FFF2-40B4-BE49-F238E27FC236}">
+                <a16:creationId xmlns:a16="http://schemas.microsoft.com/office/drawing/2014/main" id="{CC96BEA6-7729-8442-8B26-25AA5F4C426A}"/>
+              </a:ext>
+            </a:extLst>
+          </p:cNvPr>
+          <p:cNvGrpSpPr/>
+          <p:nvPr/>
+        </p:nvGrpSpPr>
+        <p:grpSpPr>
+          <a:xfrm>
+            <a:off x="2649210" y="3921557"/>
+            <a:ext cx="1421703" cy="1080000"/>
+            <a:chOff x="755360" y="5237996"/>
+            <a:chExt cx="1421703" cy="1080000"/>
+          </a:xfrm>
+        </p:grpSpPr>
+        <p:sp>
+          <p:nvSpPr>
+            <p:cNvPr id="8" name="Rectangle 28">
+              <a:extLst>
+                <a:ext uri="{FF2B5EF4-FFF2-40B4-BE49-F238E27FC236}">
+                  <a16:creationId xmlns:a16="http://schemas.microsoft.com/office/drawing/2014/main" id="{C5234EB9-2E95-A84B-81D1-87F1DCE73219}"/>
+                </a:ext>
+              </a:extLst>
+            </p:cNvPr>
+            <p:cNvSpPr/>
+            <p:nvPr/>
+          </p:nvSpPr>
+          <p:spPr>
+            <a:xfrm rot="2700000">
+              <a:off x="930924" y="5237996"/>
+              <a:ext cx="1080000" cy="1080000"/>
+            </a:xfrm>
+            <a:prstGeom prst="rect">
+              <a:avLst/>
+            </a:prstGeom>
+            <a:solidFill>
+              <a:srgbClr val="0B685E"/>
+            </a:solidFill>
+            <a:ln>
+              <a:noFill/>
+            </a:ln>
+            <a:effectLst/>
+          </p:spPr>
+          <p:style>
+            <a:lnRef idx="1">
+              <a:schemeClr val="accent1"/>
+            </a:lnRef>
+            <a:fillRef idx="3">
+              <a:schemeClr val="accent1"/>
+            </a:fillRef>
+            <a:effectRef idx="2">
+              <a:schemeClr val="accent1"/>
+            </a:effectRef>
+            <a:fontRef idx="minor">
+              <a:schemeClr val="lt1"/>
+            </a:fontRef>
+          </p:style>
+          <p:txBody>
+            <a:bodyPr rtlCol="0" anchor="ctr"/>
+            <a:lstStyle/>
+            <a:p>
+              <a:pPr algn="ctr"/>
+              <a:endParaRPr lang="en-US"/>
+            </a:p>
+          </p:txBody>
+        </p:sp>
+        <p:sp>
+          <p:nvSpPr>
+            <p:cNvPr id="9" name="TextBox 29">
+              <a:extLst>
+                <a:ext uri="{FF2B5EF4-FFF2-40B4-BE49-F238E27FC236}">
+                  <a16:creationId xmlns:a16="http://schemas.microsoft.com/office/drawing/2014/main" id="{4402FBA7-74A4-2F41-9F7D-060C6F5100E8}"/>
+                </a:ext>
+              </a:extLst>
+            </p:cNvPr>
+            <p:cNvSpPr txBox="1"/>
+            <p:nvPr/>
+          </p:nvSpPr>
+          <p:spPr>
+            <a:xfrm flipH="1">
+              <a:off x="755360" y="5369349"/>
+              <a:ext cx="1421703" cy="861774"/>
+            </a:xfrm>
+            <a:prstGeom prst="rect">
+              <a:avLst/>
+            </a:prstGeom>
+            <a:noFill/>
+          </p:spPr>
+          <p:txBody>
+            <a:bodyPr wrap="square" rtlCol="0">
+              <a:spAutoFit/>
+            </a:bodyPr>
+            <a:lstStyle/>
+            <a:p>
+              <a:r>
+                <a:rPr lang="en-US" sz="5000" dirty="0">
+                  <a:solidFill>
+                    <a:schemeClr val="bg1"/>
+                  </a:solidFill>
+                  <a:latin typeface="Vera Humana 95" charset="0"/>
+                  <a:ea typeface="Vera Humana 95" charset="0"/>
+                  <a:cs typeface="Vera Humana 95" charset="0"/>
+                </a:rPr>
+                <a:t>CMS</a:t>
+              </a:r>
+            </a:p>
+          </p:txBody>
+        </p:sp>
+      </p:grpSp>
+      <p:pic>
+        <p:nvPicPr>
+          <p:cNvPr id="3" name="图片 2">
+            <a:extLst>
+              <a:ext uri="{FF2B5EF4-FFF2-40B4-BE49-F238E27FC236}">
+                <a16:creationId xmlns:a16="http://schemas.microsoft.com/office/drawing/2014/main" id="{31231A51-C259-5840-9B70-BC15345A249E}"/>
+              </a:ext>
+            </a:extLst>
+          </p:cNvPr>
+          <p:cNvPicPr>
+            <a:picLocks noChangeAspect="1"/>
+          </p:cNvPicPr>
+          <p:nvPr/>
+        </p:nvPicPr>
+        <p:blipFill>
+          <a:blip r:embed="rId4"/>
+          <a:stretch>
+            <a:fillRect/>
+          </a:stretch>
+        </p:blipFill>
+        <p:spPr>
+          <a:xfrm>
+            <a:off x="4636827" y="995042"/>
+            <a:ext cx="1917700" cy="1752600"/>
+          </a:xfrm>
+          <a:prstGeom prst="rect">
+            <a:avLst/>
+          </a:prstGeom>
+        </p:spPr>
+      </p:pic>
+      <p:grpSp>
+        <p:nvGrpSpPr>
+          <p:cNvPr id="10" name="Group 14">
+            <a:extLst>
+              <a:ext uri="{FF2B5EF4-FFF2-40B4-BE49-F238E27FC236}">
+                <a16:creationId xmlns:a16="http://schemas.microsoft.com/office/drawing/2014/main" id="{CCC7CBF9-48AB-764A-8D07-F3E5418A6659}"/>
+              </a:ext>
+            </a:extLst>
+          </p:cNvPr>
+          <p:cNvGrpSpPr/>
+          <p:nvPr/>
+        </p:nvGrpSpPr>
+        <p:grpSpPr>
+          <a:xfrm>
+            <a:off x="4488760" y="3954155"/>
+            <a:ext cx="1421703" cy="1080000"/>
+            <a:chOff x="755360" y="5237996"/>
+            <a:chExt cx="1421703" cy="1080000"/>
+          </a:xfrm>
+        </p:grpSpPr>
+        <p:sp>
+          <p:nvSpPr>
+            <p:cNvPr id="11" name="Rectangle 28">
+              <a:extLst>
+                <a:ext uri="{FF2B5EF4-FFF2-40B4-BE49-F238E27FC236}">
+                  <a16:creationId xmlns:a16="http://schemas.microsoft.com/office/drawing/2014/main" id="{57314AEC-DEC5-E249-8625-794611F8F7D4}"/>
+                </a:ext>
+              </a:extLst>
+            </p:cNvPr>
+            <p:cNvSpPr/>
+            <p:nvPr/>
+          </p:nvSpPr>
+          <p:spPr>
+            <a:xfrm rot="2700000">
+              <a:off x="930924" y="5237996"/>
+              <a:ext cx="1080000" cy="1080000"/>
+            </a:xfrm>
+            <a:prstGeom prst="rect">
+              <a:avLst/>
+            </a:prstGeom>
+            <a:solidFill>
+              <a:srgbClr val="053385"/>
+            </a:solidFill>
+            <a:ln>
+              <a:noFill/>
+            </a:ln>
+            <a:effectLst/>
+          </p:spPr>
+          <p:style>
+            <a:lnRef idx="1">
+              <a:schemeClr val="accent1"/>
+            </a:lnRef>
+            <a:fillRef idx="3">
+              <a:schemeClr val="accent1"/>
+            </a:fillRef>
+            <a:effectRef idx="2">
+              <a:schemeClr val="accent1"/>
+            </a:effectRef>
+            <a:fontRef idx="minor">
+              <a:schemeClr val="lt1"/>
+            </a:fontRef>
+          </p:style>
+          <p:txBody>
+            <a:bodyPr rtlCol="0" anchor="ctr"/>
+            <a:lstStyle/>
+            <a:p>
+              <a:pPr algn="ctr"/>
+              <a:endParaRPr lang="en-US"/>
+            </a:p>
+          </p:txBody>
+        </p:sp>
+        <p:sp>
+          <p:nvSpPr>
+            <p:cNvPr id="12" name="TextBox 29">
+              <a:extLst>
+                <a:ext uri="{FF2B5EF4-FFF2-40B4-BE49-F238E27FC236}">
+                  <a16:creationId xmlns:a16="http://schemas.microsoft.com/office/drawing/2014/main" id="{16EC179E-002D-4A4B-BFD9-1860D58DA7C4}"/>
+                </a:ext>
+              </a:extLst>
+            </p:cNvPr>
+            <p:cNvSpPr txBox="1"/>
+            <p:nvPr/>
+          </p:nvSpPr>
+          <p:spPr>
+            <a:xfrm flipH="1">
+              <a:off x="755360" y="5369349"/>
+              <a:ext cx="1421703" cy="861774"/>
+            </a:xfrm>
+            <a:prstGeom prst="rect">
+              <a:avLst/>
+            </a:prstGeom>
+            <a:noFill/>
+          </p:spPr>
+          <p:txBody>
+            <a:bodyPr wrap="square" rtlCol="0">
+              <a:spAutoFit/>
+            </a:bodyPr>
+            <a:lstStyle/>
+            <a:p>
+              <a:r>
+                <a:rPr lang="zh-CN" altLang="en-US" sz="5000" dirty="0">
+                  <a:solidFill>
+                    <a:schemeClr val="bg1"/>
+                  </a:solidFill>
+                  <a:latin typeface="Vera Humana 95" charset="0"/>
+                  <a:ea typeface="Vera Humana 95" charset="0"/>
+                  <a:cs typeface="Vera Humana 95" charset="0"/>
+                </a:rPr>
+                <a:t> </a:t>
+              </a:r>
+              <a:r>
+                <a:rPr lang="en-US" altLang="zh-CN" sz="5000" dirty="0">
+                  <a:solidFill>
+                    <a:schemeClr val="bg1"/>
+                  </a:solidFill>
+                  <a:latin typeface="Vera Humana 95" charset="0"/>
+                  <a:ea typeface="Vera Humana 95" charset="0"/>
+                  <a:cs typeface="Vera Humana 95" charset="0"/>
+                </a:rPr>
+                <a:t>HS</a:t>
+              </a:r>
+              <a:r>
+                <a:rPr lang="en-US" sz="5000" dirty="0">
+                  <a:solidFill>
+                    <a:schemeClr val="bg1"/>
+                  </a:solidFill>
+                  <a:latin typeface="Vera Humana 95" charset="0"/>
+                  <a:ea typeface="Vera Humana 95" charset="0"/>
+                  <a:cs typeface="Vera Humana 95" charset="0"/>
+                </a:rPr>
+                <a:t>S</a:t>
+              </a:r>
+            </a:p>
+          </p:txBody>
+        </p:sp>
+      </p:grpSp>
     </p:spTree>
     <p:extLst>
       <p:ext uri="{BB962C8B-B14F-4D97-AF65-F5344CB8AC3E}">

</xml_diff>